<commit_message>
edited titel of lowatem1 and created lowatem2
</commit_message>
<xml_diff>
--- a/sae_retex/Lowatem_Phase1.pptx
+++ b/sae_retex/Lowatem_Phase1.pptx
@@ -211,7 +211,7 @@
           <a:p>
             <a:fld id="{3409E722-F049-4AAE-BBD3-8A696B6582F4}" type="datetimeFigureOut">
               <a:rPr lang="fr-FR" smtClean="0"/>
-              <a:t>12/04/2022</a:t>
+              <a:t>17/04/2022</a:t>
             </a:fld>
             <a:endParaRPr lang="fr-FR"/>
           </a:p>
@@ -431,7 +431,7 @@
           <a:p>
             <a:fld id="{0461DD1B-6DBD-4C67-82CA-2D2AD6682E71}" type="datetimeFigureOut">
               <a:rPr lang="fr-FR" smtClean="0"/>
-              <a:t>12/04/2022</a:t>
+              <a:t>17/04/2022</a:t>
             </a:fld>
             <a:endParaRPr lang="fr-FR"/>
           </a:p>
@@ -624,7 +624,7 @@
           <a:p>
             <a:fld id="{0461DD1B-6DBD-4C67-82CA-2D2AD6682E71}" type="datetimeFigureOut">
               <a:rPr lang="fr-FR" smtClean="0"/>
-              <a:t>12/04/2022</a:t>
+              <a:t>17/04/2022</a:t>
             </a:fld>
             <a:endParaRPr lang="fr-FR"/>
           </a:p>
@@ -810,7 +810,7 @@
           <a:p>
             <a:fld id="{0461DD1B-6DBD-4C67-82CA-2D2AD6682E71}" type="datetimeFigureOut">
               <a:rPr lang="fr-FR" smtClean="0"/>
-              <a:t>12/04/2022</a:t>
+              <a:t>17/04/2022</a:t>
             </a:fld>
             <a:endParaRPr lang="fr-FR"/>
           </a:p>
@@ -996,7 +996,7 @@
           <a:p>
             <a:fld id="{0461DD1B-6DBD-4C67-82CA-2D2AD6682E71}" type="datetimeFigureOut">
               <a:rPr lang="fr-FR" smtClean="0"/>
-              <a:t>12/04/2022</a:t>
+              <a:t>17/04/2022</a:t>
             </a:fld>
             <a:endParaRPr lang="fr-FR"/>
           </a:p>
@@ -1255,7 +1255,7 @@
           <a:p>
             <a:fld id="{0461DD1B-6DBD-4C67-82CA-2D2AD6682E71}" type="datetimeFigureOut">
               <a:rPr lang="fr-FR" smtClean="0"/>
-              <a:t>12/04/2022</a:t>
+              <a:t>17/04/2022</a:t>
             </a:fld>
             <a:endParaRPr lang="fr-FR"/>
           </a:p>
@@ -1501,7 +1501,7 @@
           <a:p>
             <a:fld id="{0461DD1B-6DBD-4C67-82CA-2D2AD6682E71}" type="datetimeFigureOut">
               <a:rPr lang="fr-FR" smtClean="0"/>
-              <a:t>12/04/2022</a:t>
+              <a:t>17/04/2022</a:t>
             </a:fld>
             <a:endParaRPr lang="fr-FR"/>
           </a:p>
@@ -1883,7 +1883,7 @@
           <a:p>
             <a:fld id="{0461DD1B-6DBD-4C67-82CA-2D2AD6682E71}" type="datetimeFigureOut">
               <a:rPr lang="fr-FR" smtClean="0"/>
-              <a:t>12/04/2022</a:t>
+              <a:t>17/04/2022</a:t>
             </a:fld>
             <a:endParaRPr lang="fr-FR"/>
           </a:p>
@@ -2009,7 +2009,7 @@
           <a:p>
             <a:fld id="{0461DD1B-6DBD-4C67-82CA-2D2AD6682E71}" type="datetimeFigureOut">
               <a:rPr lang="fr-FR" smtClean="0"/>
-              <a:t>12/04/2022</a:t>
+              <a:t>17/04/2022</a:t>
             </a:fld>
             <a:endParaRPr lang="fr-FR"/>
           </a:p>
@@ -2104,7 +2104,7 @@
           <a:p>
             <a:fld id="{0461DD1B-6DBD-4C67-82CA-2D2AD6682E71}" type="datetimeFigureOut">
               <a:rPr lang="fr-FR" smtClean="0"/>
-              <a:t>12/04/2022</a:t>
+              <a:t>17/04/2022</a:t>
             </a:fld>
             <a:endParaRPr lang="fr-FR"/>
           </a:p>
@@ -2390,7 +2390,7 @@
           <a:p>
             <a:fld id="{0461DD1B-6DBD-4C67-82CA-2D2AD6682E71}" type="datetimeFigureOut">
               <a:rPr lang="fr-FR" smtClean="0"/>
-              <a:t>12/04/2022</a:t>
+              <a:t>17/04/2022</a:t>
             </a:fld>
             <a:endParaRPr lang="fr-FR"/>
           </a:p>
@@ -2652,7 +2652,7 @@
           <a:p>
             <a:fld id="{0461DD1B-6DBD-4C67-82CA-2D2AD6682E71}" type="datetimeFigureOut">
               <a:rPr lang="fr-FR" smtClean="0"/>
-              <a:t>12/04/2022</a:t>
+              <a:t>17/04/2022</a:t>
             </a:fld>
             <a:endParaRPr lang="fr-FR"/>
           </a:p>
@@ -2910,7 +2910,7 @@
         <p:txBody>
           <a:bodyPr vert="horz" lIns="91440" tIns="45720" rIns="91440" bIns="45720" rtlCol="0" anchor="ctr"/>
           <a:lstStyle>
-            <a:lvl1pPr algn="l">
+            <a:lvl1pPr algn="ctr">
               <a:defRPr sz="1200">
                 <a:solidFill>
                   <a:schemeClr val="tx1"/>
@@ -2919,11 +2919,10 @@
             </a:lvl1pPr>
           </a:lstStyle>
           <a:p>
-            <a:fld id="{0461DD1B-6DBD-4C67-82CA-2D2AD6682E71}" type="datetimeFigureOut">
-              <a:rPr lang="fr-FR" smtClean="0"/>
-              <a:pPr/>
-              <a:t>12/04/2022</a:t>
-            </a:fld>
+            <a:r>
+              <a:rPr lang="fr-FR" dirty="0" smtClean="0"/>
+              <a:t>15/10/2021 – 29/10/2021</a:t>
+            </a:r>
             <a:endParaRPr lang="fr-FR" dirty="0"/>
           </a:p>
         </p:txBody>
@@ -3014,11 +3013,10 @@
             </a:lvl1pPr>
           </a:lstStyle>
           <a:p>
-            <a:fld id="{D07C23C2-5C1D-40A9-AAAA-9D9D0FEFBBC0}" type="slidenum">
-              <a:rPr lang="fr-FR" smtClean="0"/>
-              <a:pPr/>
-              <a:t>‹N°›</a:t>
-            </a:fld>
+            <a:r>
+              <a:rPr lang="fr-FR" dirty="0" smtClean="0"/>
+              <a:t>Durée :2  semaines</a:t>
+            </a:r>
             <a:endParaRPr lang="fr-FR" dirty="0"/>
           </a:p>
         </p:txBody>
@@ -3775,8 +3773,8 @@
         </p:nvSpPr>
         <p:spPr>
           <a:xfrm>
-            <a:off x="1998236" y="84782"/>
-            <a:ext cx="4116448" cy="923330"/>
+            <a:off x="981905" y="84782"/>
+            <a:ext cx="6149120" cy="923330"/>
           </a:xfrm>
           <a:prstGeom prst="rect">
             <a:avLst/>
@@ -3812,10 +3810,10 @@
                 </a:effectLst>
                 <a:latin typeface="Gill Sans MT" panose="020B0502020104020203" pitchFamily="34" charset="0"/>
               </a:rPr>
-              <a:t>Sample </a:t>
-            </a:r>
-            <a:r>
-              <a:rPr lang="fr-FR" sz="5400" b="1" cap="none" spc="0" dirty="0" err="1" smtClean="0">
+              <a:t>Phase</a:t>
+            </a:r>
+            <a:r>
+              <a:rPr lang="fr-FR" sz="5400" b="1" cap="none" spc="0" baseline="0" dirty="0" smtClean="0">
                 <a:ln w="0"/>
                 <a:solidFill>
                   <a:schemeClr val="tx1"/>
@@ -3829,7 +3827,58 @@
                 </a:effectLst>
                 <a:latin typeface="Gill Sans MT" panose="020B0502020104020203" pitchFamily="34" charset="0"/>
               </a:rPr>
-              <a:t>Text</a:t>
+              <a:t> </a:t>
+            </a:r>
+            <a:r>
+              <a:rPr lang="fr-FR" sz="5400" b="1" i="0" cap="none" spc="0" baseline="0" dirty="0" smtClean="0">
+                <a:ln w="0"/>
+                <a:solidFill>
+                  <a:schemeClr val="tx1"/>
+                </a:solidFill>
+                <a:effectLst>
+                  <a:outerShdw blurRad="38100" dist="19050" dir="2700000" algn="tl" rotWithShape="0">
+                    <a:schemeClr val="dk1">
+                      <a:alpha val="40000"/>
+                    </a:schemeClr>
+                  </a:outerShdw>
+                </a:effectLst>
+                <a:latin typeface="Gill Sans MT" panose="020B0502020104020203" pitchFamily="34" charset="0"/>
+              </a:rPr>
+              <a:t>I</a:t>
+            </a:r>
+            <a:r>
+              <a:rPr lang="fr-FR" sz="5400" b="1" cap="none" spc="0" baseline="0" dirty="0" smtClean="0">
+                <a:ln w="0"/>
+                <a:solidFill>
+                  <a:schemeClr val="tx1"/>
+                </a:solidFill>
+                <a:effectLst>
+                  <a:outerShdw blurRad="38100" dist="19050" dir="2700000" algn="tl" rotWithShape="0">
+                    <a:schemeClr val="dk1">
+                      <a:alpha val="40000"/>
+                    </a:schemeClr>
+                  </a:outerShdw>
+                </a:effectLst>
+                <a:latin typeface="Gill Sans MT" panose="020B0502020104020203" pitchFamily="34" charset="0"/>
+              </a:rPr>
+              <a:t> - </a:t>
+            </a:r>
+            <a:r>
+              <a:rPr lang="fr-FR" sz="5400" b="1" cap="none" spc="0" baseline="0" dirty="0" err="1" smtClean="0">
+                <a:ln w="0"/>
+                <a:solidFill>
+                  <a:schemeClr val="tx1"/>
+                </a:solidFill>
+                <a:effectLst>
+                  <a:outerShdw blurRad="38100" dist="19050" dir="2700000" algn="tl" rotWithShape="0">
+                    <a:schemeClr val="dk1">
+                      <a:alpha val="40000"/>
+                    </a:schemeClr>
+                  </a:outerShdw>
+                </a:effectLst>
+                <a:latin typeface="Gill Sans MT" panose="020B0502020104020203" pitchFamily="34" charset="0"/>
+              </a:rPr>
+              <a:t>Lowatem</a:t>
             </a:r>
             <a:endParaRPr lang="fr-FR" sz="5400" b="1" cap="none" spc="0" dirty="0">
               <a:ln w="0"/>
@@ -3856,8 +3905,8 @@
         </p:nvSpPr>
         <p:spPr>
           <a:xfrm>
-            <a:off x="902581" y="1645535"/>
-            <a:ext cx="6120680" cy="1295868"/>
+            <a:off x="857666" y="1645535"/>
+            <a:ext cx="6442235" cy="1754326"/>
           </a:xfrm>
           <a:prstGeom prst="rect">
             <a:avLst/>
@@ -3879,6 +3928,15 @@
               <a:rPr lang="fr-FR" b="1" dirty="0" smtClean="0"/>
               <a:t>&gt;</a:t>
             </a:r>
+            <a:r>
+              <a:rPr lang="fr-FR" b="1" baseline="0" dirty="0" smtClean="0"/>
+              <a:t> </a:t>
+            </a:r>
+            <a:r>
+              <a:rPr lang="fr-FR" b="0" baseline="0" dirty="0" smtClean="0"/>
+              <a:t>Forme de jeu-vidéo à coder dont les règles sont imposées</a:t>
+            </a:r>
+            <a:endParaRPr lang="fr-FR" b="0" dirty="0" smtClean="0"/>
           </a:p>
           <a:p>
             <a:pPr>
@@ -3890,6 +3948,15 @@
               <a:rPr lang="fr-FR" b="1" dirty="0" smtClean="0"/>
               <a:t>&gt;</a:t>
             </a:r>
+            <a:r>
+              <a:rPr lang="fr-FR" b="0" dirty="0" smtClean="0"/>
+              <a:t> Écrire des algorithmes en fonction de</a:t>
+            </a:r>
+            <a:r>
+              <a:rPr lang="fr-FR" b="0" baseline="0" dirty="0" smtClean="0"/>
+              <a:t> la règle en question</a:t>
+            </a:r>
+            <a:endParaRPr lang="fr-FR" b="0" dirty="0" smtClean="0"/>
           </a:p>
           <a:p>
             <a:pPr>
@@ -3901,20 +3968,40 @@
               <a:rPr lang="fr-FR" b="1" dirty="0" smtClean="0"/>
               <a:t>&gt;</a:t>
             </a:r>
+            <a:r>
+              <a:rPr lang="fr-FR" b="1" baseline="0" dirty="0" smtClean="0"/>
+              <a:t> </a:t>
+            </a:r>
+            <a:r>
+              <a:rPr lang="fr-FR" b="0" baseline="0" dirty="0" smtClean="0"/>
+              <a:t>Difficulté croissante en fonction de notre progression (14 étapes)</a:t>
+            </a:r>
+            <a:endParaRPr lang="fr-FR" b="1" dirty="0" smtClean="0"/>
+          </a:p>
+          <a:p>
+            <a:pPr>
+              <a:lnSpc>
+                <a:spcPct val="150000"/>
+              </a:lnSpc>
+            </a:pPr>
+            <a:r>
+              <a:rPr lang="fr-FR" b="1" dirty="0" smtClean="0"/>
+              <a:t> </a:t>
+            </a:r>
             <a:endParaRPr lang="fr-FR" b="1" dirty="0"/>
           </a:p>
         </p:txBody>
       </p:sp>
       <p:sp>
         <p:nvSpPr>
-          <p:cNvPr id="20" name="ZoneTexte 19"/>
+          <p:cNvPr id="32" name="ZoneTexte 31"/>
           <p:cNvSpPr txBox="1"/>
           <p:nvPr userDrawn="1"/>
         </p:nvSpPr>
         <p:spPr>
           <a:xfrm>
-            <a:off x="8379007" y="2334489"/>
-            <a:ext cx="2952328" cy="646331"/>
+            <a:off x="8027363" y="2402655"/>
+            <a:ext cx="2023805" cy="584775"/>
           </a:xfrm>
           <a:prstGeom prst="rect">
             <a:avLst/>
@@ -3929,34 +4016,373 @@
           <a:p>
             <a:pPr algn="ctr"/>
             <a:r>
-              <a:rPr lang="fr-FR" dirty="0" err="1" smtClean="0">
+              <a:rPr lang="fr-FR" sz="1600" dirty="0" smtClean="0">
                 <a:latin typeface="Noto Mono" panose="020B0609030804020204" pitchFamily="49" charset="0"/>
                 <a:ea typeface="Noto Mono" panose="020B0609030804020204" pitchFamily="49" charset="0"/>
                 <a:cs typeface="Noto Mono" panose="020B0609030804020204" pitchFamily="49" charset="0"/>
               </a:rPr>
-              <a:t>Stuff</a:t>
-            </a:r>
-            <a:endParaRPr lang="fr-FR" dirty="0" smtClean="0">
+              <a:t>Programmation itérative</a:t>
+            </a:r>
+            <a:endParaRPr lang="fr-FR" sz="1600" dirty="0">
               <a:latin typeface="Noto Mono" panose="020B0609030804020204" pitchFamily="49" charset="0"/>
               <a:ea typeface="Noto Mono" panose="020B0609030804020204" pitchFamily="49" charset="0"/>
               <a:cs typeface="Noto Mono" panose="020B0609030804020204" pitchFamily="49" charset="0"/>
             </a:endParaRPr>
           </a:p>
+        </p:txBody>
+      </p:sp>
+      <p:pic>
+        <p:nvPicPr>
+          <p:cNvPr id="34" name="Image 33"/>
+          <p:cNvPicPr>
+            <a:picLocks noChangeAspect="1"/>
+          </p:cNvPicPr>
+          <p:nvPr userDrawn="1"/>
+        </p:nvPicPr>
+        <p:blipFill>
+          <a:blip r:embed="rId13" cstate="print">
+            <a:extLst>
+              <a:ext uri="{28A0092B-C50C-407E-A947-70E740481C1C}">
+                <a14:useLocalDpi xmlns:a14="http://schemas.microsoft.com/office/drawing/2010/main" val="0"/>
+              </a:ext>
+            </a:extLst>
+          </a:blip>
+          <a:stretch>
+            <a:fillRect/>
+          </a:stretch>
+        </p:blipFill>
+        <p:spPr>
+          <a:xfrm>
+            <a:off x="10037924" y="407389"/>
+            <a:ext cx="729776" cy="985872"/>
+          </a:xfrm>
+          <a:prstGeom prst="rect">
+            <a:avLst/>
+          </a:prstGeom>
+        </p:spPr>
+      </p:pic>
+      <p:pic>
+        <p:nvPicPr>
+          <p:cNvPr id="35" name="Image 34"/>
+          <p:cNvPicPr>
+            <a:picLocks noChangeAspect="1"/>
+          </p:cNvPicPr>
+          <p:nvPr userDrawn="1"/>
+        </p:nvPicPr>
+        <p:blipFill>
+          <a:blip r:embed="rId14" cstate="print">
+            <a:extLst>
+              <a:ext uri="{28A0092B-C50C-407E-A947-70E740481C1C}">
+                <a14:useLocalDpi xmlns:a14="http://schemas.microsoft.com/office/drawing/2010/main" val="0"/>
+              </a:ext>
+            </a:extLst>
+          </a:blip>
+          <a:stretch>
+            <a:fillRect/>
+          </a:stretch>
+        </p:blipFill>
+        <p:spPr>
+          <a:xfrm>
+            <a:off x="8961735" y="678989"/>
+            <a:ext cx="627611" cy="723732"/>
+          </a:xfrm>
+          <a:prstGeom prst="rect">
+            <a:avLst/>
+          </a:prstGeom>
+        </p:spPr>
+      </p:pic>
+      <p:sp>
+        <p:nvSpPr>
+          <p:cNvPr id="36" name="ZoneTexte 35"/>
+          <p:cNvSpPr txBox="1"/>
+          <p:nvPr userDrawn="1"/>
+        </p:nvSpPr>
+        <p:spPr>
+          <a:xfrm>
+            <a:off x="6615236" y="4145862"/>
+            <a:ext cx="5587752" cy="1815882"/>
+          </a:xfrm>
+          <a:prstGeom prst="rect">
+            <a:avLst/>
+          </a:prstGeom>
+          <a:noFill/>
+        </p:spPr>
+        <p:txBody>
+          <a:bodyPr wrap="square" rtlCol="0">
+            <a:spAutoFit/>
+          </a:bodyPr>
+          <a:lstStyle/>
+          <a:p>
+            <a:r>
+              <a:rPr lang="fr-FR" sz="1600" dirty="0" smtClean="0"/>
+              <a:t>                </a:t>
+            </a:r>
+            <a:r>
+              <a:rPr lang="fr-FR" sz="1600" dirty="0" smtClean="0"/>
+              <a:t> Importance des fonctions « métiers »</a:t>
+            </a:r>
+          </a:p>
+          <a:p>
+            <a:endParaRPr lang="fr-FR" sz="1600" baseline="0" dirty="0" smtClean="0"/>
+          </a:p>
+          <a:p>
+            <a:r>
+              <a:rPr lang="fr-FR" sz="1600" baseline="0" dirty="0" smtClean="0"/>
+              <a:t>             </a:t>
+            </a:r>
+            <a:r>
+              <a:rPr lang="fr-FR" sz="1600" baseline="0" dirty="0" smtClean="0"/>
+              <a:t>Familiarisation avec le Test </a:t>
+            </a:r>
+            <a:r>
+              <a:rPr lang="fr-FR" sz="1600" baseline="0" dirty="0" err="1" smtClean="0"/>
+              <a:t>Driven</a:t>
+            </a:r>
+            <a:r>
+              <a:rPr lang="fr-FR" sz="1600" baseline="0" dirty="0" smtClean="0"/>
+              <a:t> </a:t>
+            </a:r>
+            <a:r>
+              <a:rPr lang="fr-FR" sz="1600" baseline="0" dirty="0" err="1" smtClean="0"/>
+              <a:t>Development</a:t>
+            </a:r>
+            <a:endParaRPr lang="fr-FR" sz="1600" baseline="0" dirty="0" smtClean="0"/>
+          </a:p>
+          <a:p>
+            <a:endParaRPr lang="fr-FR" sz="1600" baseline="0" dirty="0" smtClean="0"/>
+          </a:p>
+          <a:p>
+            <a:r>
+              <a:rPr lang="fr-FR" sz="1600" baseline="0" dirty="0" smtClean="0"/>
+              <a:t>         Réflexion algorithmique et gestion d’un projet personnel</a:t>
+            </a:r>
+          </a:p>
+          <a:p>
+            <a:r>
+              <a:rPr lang="fr-FR" sz="1600" baseline="0" dirty="0" smtClean="0"/>
+              <a:t>         Communication et entraide pour résoudre un problème</a:t>
+            </a:r>
+          </a:p>
+          <a:p>
+            <a:endParaRPr lang="fr-FR" sz="1600" baseline="0" dirty="0" smtClean="0"/>
+          </a:p>
+        </p:txBody>
+      </p:sp>
+      <p:pic>
+        <p:nvPicPr>
+          <p:cNvPr id="37" name="Image 36"/>
+          <p:cNvPicPr>
+            <a:picLocks noChangeAspect="1"/>
+          </p:cNvPicPr>
+          <p:nvPr userDrawn="1"/>
+        </p:nvPicPr>
+        <p:blipFill>
+          <a:blip r:embed="rId15" cstate="print">
+            <a:extLst>
+              <a:ext uri="{28A0092B-C50C-407E-A947-70E740481C1C}">
+                <a14:useLocalDpi xmlns:a14="http://schemas.microsoft.com/office/drawing/2010/main" val="0"/>
+              </a:ext>
+            </a:extLst>
+          </a:blip>
+          <a:stretch>
+            <a:fillRect/>
+          </a:stretch>
+        </p:blipFill>
+        <p:spPr>
+          <a:xfrm>
+            <a:off x="7142047" y="4176479"/>
+            <a:ext cx="306085" cy="306085"/>
+          </a:xfrm>
+          <a:prstGeom prst="rect">
+            <a:avLst/>
+          </a:prstGeom>
+        </p:spPr>
+      </p:pic>
+      <p:pic>
+        <p:nvPicPr>
+          <p:cNvPr id="39" name="Image 38"/>
+          <p:cNvPicPr>
+            <a:picLocks noChangeAspect="1"/>
+          </p:cNvPicPr>
+          <p:nvPr userDrawn="1"/>
+        </p:nvPicPr>
+        <p:blipFill>
+          <a:blip r:embed="rId16" cstate="print">
+            <a:extLst>
+              <a:ext uri="{28A0092B-C50C-407E-A947-70E740481C1C}">
+                <a14:useLocalDpi xmlns:a14="http://schemas.microsoft.com/office/drawing/2010/main" val="0"/>
+              </a:ext>
+            </a:extLst>
+          </a:blip>
+          <a:stretch>
+            <a:fillRect/>
+          </a:stretch>
+        </p:blipFill>
+        <p:spPr>
+          <a:xfrm>
+            <a:off x="6894483" y="4611624"/>
+            <a:ext cx="384744" cy="384744"/>
+          </a:xfrm>
+          <a:prstGeom prst="rect">
+            <a:avLst/>
+          </a:prstGeom>
+        </p:spPr>
+      </p:pic>
+      <p:pic>
+        <p:nvPicPr>
+          <p:cNvPr id="40" name="Image 39"/>
+          <p:cNvPicPr>
+            <a:picLocks noChangeAspect="1"/>
+          </p:cNvPicPr>
+          <p:nvPr userDrawn="1"/>
+        </p:nvPicPr>
+        <p:blipFill>
+          <a:blip r:embed="rId17" cstate="print">
+            <a:extLst>
+              <a:ext uri="{28A0092B-C50C-407E-A947-70E740481C1C}">
+                <a14:useLocalDpi xmlns:a14="http://schemas.microsoft.com/office/drawing/2010/main" val="0"/>
+              </a:ext>
+            </a:extLst>
+          </a:blip>
+          <a:stretch>
+            <a:fillRect/>
+          </a:stretch>
+        </p:blipFill>
+        <p:spPr>
+          <a:xfrm>
+            <a:off x="6642245" y="5187414"/>
+            <a:ext cx="427955" cy="427955"/>
+          </a:xfrm>
+          <a:prstGeom prst="rect">
+            <a:avLst/>
+          </a:prstGeom>
+        </p:spPr>
+      </p:pic>
+      <p:sp>
+        <p:nvSpPr>
+          <p:cNvPr id="41" name="ZoneTexte 40"/>
+          <p:cNvSpPr txBox="1"/>
+          <p:nvPr userDrawn="1"/>
+        </p:nvSpPr>
+        <p:spPr>
+          <a:xfrm>
+            <a:off x="9705012" y="2402655"/>
+            <a:ext cx="2023805" cy="584775"/>
+          </a:xfrm>
+          <a:prstGeom prst="rect">
+            <a:avLst/>
+          </a:prstGeom>
+          <a:noFill/>
+        </p:spPr>
+        <p:txBody>
+          <a:bodyPr wrap="square" rtlCol="0">
+            <a:spAutoFit/>
+          </a:bodyPr>
+          <a:lstStyle/>
           <a:p>
             <a:pPr algn="ctr"/>
             <a:r>
-              <a:rPr lang="fr-FR" dirty="0" err="1" smtClean="0">
+              <a:rPr lang="fr-FR" sz="1600" dirty="0" smtClean="0">
                 <a:latin typeface="Noto Mono" panose="020B0609030804020204" pitchFamily="49" charset="0"/>
                 <a:ea typeface="Noto Mono" panose="020B0609030804020204" pitchFamily="49" charset="0"/>
                 <a:cs typeface="Noto Mono" panose="020B0609030804020204" pitchFamily="49" charset="0"/>
               </a:rPr>
-              <a:t>Stuff</a:t>
-            </a:r>
-            <a:endParaRPr lang="fr-FR" dirty="0">
+              <a:t>Test </a:t>
+            </a:r>
+            <a:r>
+              <a:rPr lang="fr-FR" sz="1600" dirty="0" err="1" smtClean="0">
+                <a:latin typeface="Noto Mono" panose="020B0609030804020204" pitchFamily="49" charset="0"/>
+                <a:ea typeface="Noto Mono" panose="020B0609030804020204" pitchFamily="49" charset="0"/>
+                <a:cs typeface="Noto Mono" panose="020B0609030804020204" pitchFamily="49" charset="0"/>
+              </a:rPr>
+              <a:t>Driven</a:t>
+            </a:r>
+            <a:r>
+              <a:rPr lang="fr-FR" sz="1600" dirty="0" smtClean="0">
+                <a:latin typeface="Noto Mono" panose="020B0609030804020204" pitchFamily="49" charset="0"/>
+                <a:ea typeface="Noto Mono" panose="020B0609030804020204" pitchFamily="49" charset="0"/>
+                <a:cs typeface="Noto Mono" panose="020B0609030804020204" pitchFamily="49" charset="0"/>
+              </a:rPr>
+              <a:t> </a:t>
+            </a:r>
+            <a:r>
+              <a:rPr lang="fr-FR" sz="1600" dirty="0" err="1" smtClean="0">
+                <a:latin typeface="Noto Mono" panose="020B0609030804020204" pitchFamily="49" charset="0"/>
+                <a:ea typeface="Noto Mono" panose="020B0609030804020204" pitchFamily="49" charset="0"/>
+                <a:cs typeface="Noto Mono" panose="020B0609030804020204" pitchFamily="49" charset="0"/>
+              </a:rPr>
+              <a:t>Development</a:t>
+            </a:r>
+            <a:endParaRPr lang="fr-FR" sz="1600" dirty="0">
               <a:latin typeface="Noto Mono" panose="020B0609030804020204" pitchFamily="49" charset="0"/>
               <a:ea typeface="Noto Mono" panose="020B0609030804020204" pitchFamily="49" charset="0"/>
               <a:cs typeface="Noto Mono" panose="020B0609030804020204" pitchFamily="49" charset="0"/>
             </a:endParaRPr>
+          </a:p>
+        </p:txBody>
+      </p:sp>
+      <p:cxnSp>
+        <p:nvCxnSpPr>
+          <p:cNvPr id="7" name="Connecteur droit 6"/>
+          <p:cNvCxnSpPr/>
+          <p:nvPr userDrawn="1"/>
+        </p:nvCxnSpPr>
+        <p:spPr>
+          <a:xfrm flipH="1">
+            <a:off x="9886003" y="2364996"/>
+            <a:ext cx="1" cy="624771"/>
+          </a:xfrm>
+          <a:prstGeom prst="line">
+            <a:avLst/>
+          </a:prstGeom>
+          <a:ln w="19050"/>
+        </p:spPr>
+        <p:style>
+          <a:lnRef idx="3">
+            <a:schemeClr val="dk1"/>
+          </a:lnRef>
+          <a:fillRef idx="0">
+            <a:schemeClr val="dk1"/>
+          </a:fillRef>
+          <a:effectRef idx="2">
+            <a:schemeClr val="dk1"/>
+          </a:effectRef>
+          <a:fontRef idx="minor">
+            <a:schemeClr val="tx1"/>
+          </a:fontRef>
+        </p:style>
+      </p:cxnSp>
+      <p:sp>
+        <p:nvSpPr>
+          <p:cNvPr id="11" name="ZoneTexte 10"/>
+          <p:cNvSpPr txBox="1"/>
+          <p:nvPr userDrawn="1"/>
+        </p:nvSpPr>
+        <p:spPr>
+          <a:xfrm>
+            <a:off x="917825" y="4406595"/>
+            <a:ext cx="4573061" cy="923330"/>
+          </a:xfrm>
+          <a:prstGeom prst="rect">
+            <a:avLst/>
+          </a:prstGeom>
+          <a:noFill/>
+        </p:spPr>
+        <p:txBody>
+          <a:bodyPr wrap="square" rtlCol="0">
+            <a:spAutoFit/>
+          </a:bodyPr>
+          <a:lstStyle/>
+          <a:p>
+            <a:r>
+              <a:rPr lang="fr-FR" dirty="0" smtClean="0"/>
+              <a:t>Sur les 14 étapes données,</a:t>
+            </a:r>
+            <a:r>
+              <a:rPr lang="fr-FR" baseline="0" dirty="0" smtClean="0"/>
+              <a:t> un programme fonctionnel ayant atteint l’étape 12, ayant des tests pour chaque étape à passer</a:t>
+            </a:r>
+            <a:endParaRPr lang="fr-FR" dirty="0"/>
           </a:p>
         </p:txBody>
       </p:sp>

</xml_diff>